<commit_message>
Improve frontend UI and backend API integration
Enhanced frontend loading states, chapter dropdown, and dynamic bar for better UX. Updated backend CORS settings and API root endpoint for reliability. Adjusted Vercel config to use rewrites for API routing.
</commit_message>
<xml_diff>
--- a/GUI-design.pptx
+++ b/GUI-design.pptx
@@ -5,7 +5,7 @@
     <p:sldMasterId id="2147483648" r:id="rId1"/>
   </p:sldMasterIdLst>
   <p:notesMasterIdLst>
-    <p:notesMasterId r:id="rId11"/>
+    <p:notesMasterId r:id="rId12"/>
   </p:notesMasterIdLst>
   <p:sldIdLst>
     <p:sldId id="256" r:id="rId2"/>
@@ -17,6 +17,7 @@
     <p:sldId id="262" r:id="rId8"/>
     <p:sldId id="264" r:id="rId9"/>
     <p:sldId id="265" r:id="rId10"/>
+    <p:sldId id="266" r:id="rId11"/>
   </p:sldIdLst>
   <p:sldSz cx="12192000" cy="6858000"/>
   <p:notesSz cx="6858000" cy="9144000"/>
@@ -115,6 +116,11 @@
       </a:defRPr>
     </a:lvl9pPr>
   </p:defaultTextStyle>
+  <p:extLst>
+    <p:ext uri="{EFAFB233-063F-42B5-8137-9DF3F51BA10A}">
+      <p15:sldGuideLst xmlns:p15="http://schemas.microsoft.com/office/powerpoint/2012/main"/>
+    </p:ext>
+  </p:extLst>
 </p:presentation>
 </file>
 
@@ -228,7 +234,7 @@
           <a:p>
             <a:fld id="{241CD573-D599-2847-BBDA-6BFAA524DB5F}" type="datetimeFigureOut">
               <a:rPr lang="en-US" smtClean="0"/>
-              <a:t>11/20/25</a:t>
+              <a:t>11/21/25</a:t>
             </a:fld>
             <a:endParaRPr lang="en-US"/>
           </a:p>
@@ -642,7 +648,7 @@
           <a:p>
             <a:fld id="{8738307C-8EDA-4B45-B77E-3F369AD75B9E}" type="datetimeFigureOut">
               <a:rPr lang="en-US" smtClean="0"/>
-              <a:t>11/20/25</a:t>
+              <a:t>11/21/25</a:t>
             </a:fld>
             <a:endParaRPr lang="en-US"/>
           </a:p>
@@ -840,7 +846,7 @@
           <a:p>
             <a:fld id="{8738307C-8EDA-4B45-B77E-3F369AD75B9E}" type="datetimeFigureOut">
               <a:rPr lang="en-US" smtClean="0"/>
-              <a:t>11/20/25</a:t>
+              <a:t>11/21/25</a:t>
             </a:fld>
             <a:endParaRPr lang="en-US"/>
           </a:p>
@@ -1048,7 +1054,7 @@
           <a:p>
             <a:fld id="{8738307C-8EDA-4B45-B77E-3F369AD75B9E}" type="datetimeFigureOut">
               <a:rPr lang="en-US" smtClean="0"/>
-              <a:t>11/20/25</a:t>
+              <a:t>11/21/25</a:t>
             </a:fld>
             <a:endParaRPr lang="en-US"/>
           </a:p>
@@ -1246,7 +1252,7 @@
           <a:p>
             <a:fld id="{8738307C-8EDA-4B45-B77E-3F369AD75B9E}" type="datetimeFigureOut">
               <a:rPr lang="en-US" smtClean="0"/>
-              <a:t>11/20/25</a:t>
+              <a:t>11/21/25</a:t>
             </a:fld>
             <a:endParaRPr lang="en-US"/>
           </a:p>
@@ -1521,7 +1527,7 @@
           <a:p>
             <a:fld id="{8738307C-8EDA-4B45-B77E-3F369AD75B9E}" type="datetimeFigureOut">
               <a:rPr lang="en-US" smtClean="0"/>
-              <a:t>11/20/25</a:t>
+              <a:t>11/21/25</a:t>
             </a:fld>
             <a:endParaRPr lang="en-US"/>
           </a:p>
@@ -1786,7 +1792,7 @@
           <a:p>
             <a:fld id="{8738307C-8EDA-4B45-B77E-3F369AD75B9E}" type="datetimeFigureOut">
               <a:rPr lang="en-US" smtClean="0"/>
-              <a:t>11/20/25</a:t>
+              <a:t>11/21/25</a:t>
             </a:fld>
             <a:endParaRPr lang="en-US"/>
           </a:p>
@@ -2198,7 +2204,7 @@
           <a:p>
             <a:fld id="{8738307C-8EDA-4B45-B77E-3F369AD75B9E}" type="datetimeFigureOut">
               <a:rPr lang="en-US" smtClean="0"/>
-              <a:t>11/20/25</a:t>
+              <a:t>11/21/25</a:t>
             </a:fld>
             <a:endParaRPr lang="en-US"/>
           </a:p>
@@ -2339,7 +2345,7 @@
           <a:p>
             <a:fld id="{8738307C-8EDA-4B45-B77E-3F369AD75B9E}" type="datetimeFigureOut">
               <a:rPr lang="en-US" smtClean="0"/>
-              <a:t>11/20/25</a:t>
+              <a:t>11/21/25</a:t>
             </a:fld>
             <a:endParaRPr lang="en-US"/>
           </a:p>
@@ -2452,7 +2458,7 @@
           <a:p>
             <a:fld id="{8738307C-8EDA-4B45-B77E-3F369AD75B9E}" type="datetimeFigureOut">
               <a:rPr lang="en-US" smtClean="0"/>
-              <a:t>11/20/25</a:t>
+              <a:t>11/21/25</a:t>
             </a:fld>
             <a:endParaRPr lang="en-US"/>
           </a:p>
@@ -2763,7 +2769,7 @@
           <a:p>
             <a:fld id="{8738307C-8EDA-4B45-B77E-3F369AD75B9E}" type="datetimeFigureOut">
               <a:rPr lang="en-US" smtClean="0"/>
-              <a:t>11/20/25</a:t>
+              <a:t>11/21/25</a:t>
             </a:fld>
             <a:endParaRPr lang="en-US"/>
           </a:p>
@@ -3051,7 +3057,7 @@
           <a:p>
             <a:fld id="{8738307C-8EDA-4B45-B77E-3F369AD75B9E}" type="datetimeFigureOut">
               <a:rPr lang="en-US" smtClean="0"/>
-              <a:t>11/20/25</a:t>
+              <a:t>11/21/25</a:t>
             </a:fld>
             <a:endParaRPr lang="en-US"/>
           </a:p>
@@ -3292,7 +3298,7 @@
           <a:p>
             <a:fld id="{8738307C-8EDA-4B45-B77E-3F369AD75B9E}" type="datetimeFigureOut">
               <a:rPr lang="en-US" smtClean="0"/>
-              <a:t>11/20/25</a:t>
+              <a:t>11/21/25</a:t>
             </a:fld>
             <a:endParaRPr lang="en-US"/>
           </a:p>
@@ -3881,8 +3887,8 @@
           </a:prstGeom>
         </p:spPr>
       </p:pic>
-      <mc:AlternateContent xmlns:mc="http://schemas.openxmlformats.org/markup-compatibility/2006">
-        <mc:Choice xmlns:p14="http://schemas.microsoft.com/office/powerpoint/2010/main" Requires="p14">
+      <mc:AlternateContent xmlns:mc="http://schemas.openxmlformats.org/markup-compatibility/2006" xmlns:p14="http://schemas.microsoft.com/office/powerpoint/2010/main">
+        <mc:Choice Requires="p14">
           <p:contentPart p14:bwMode="auto" r:id="rId4">
             <p14:nvContentPartPr>
               <p14:cNvPr id="15" name="Ink 14">
@@ -3901,7 +3907,7 @@
             </p14:xfrm>
           </p:contentPart>
         </mc:Choice>
-        <mc:Fallback>
+        <mc:Fallback xmlns="">
           <p:pic>
             <p:nvPicPr>
               <p:cNvPr id="15" name="Ink 14">
@@ -4065,6 +4071,110 @@
     <p:extLst>
       <p:ext uri="{BB962C8B-B14F-4D97-AF65-F5344CB8AC3E}">
         <p14:creationId xmlns:p14="http://schemas.microsoft.com/office/powerpoint/2010/main" val="2224272099"/>
+      </p:ext>
+    </p:extLst>
+  </p:cSld>
+  <p:clrMapOvr>
+    <a:masterClrMapping/>
+  </p:clrMapOvr>
+</p:sld>
+</file>
+
+<file path=ppt/slides/slide10.xml><?xml version="1.0" encoding="utf-8"?>
+<p:sld xmlns:a="http://schemas.openxmlformats.org/drawingml/2006/main" xmlns:r="http://schemas.openxmlformats.org/officeDocument/2006/relationships" xmlns:p="http://schemas.openxmlformats.org/presentationml/2006/main">
+  <p:cSld>
+    <p:bg>
+      <p:bgPr>
+        <a:solidFill>
+          <a:srgbClr val="161618"/>
+        </a:solidFill>
+        <a:effectLst/>
+      </p:bgPr>
+    </p:bg>
+    <p:spTree>
+      <p:nvGrpSpPr>
+        <p:cNvPr id="1" name="">
+          <a:extLst>
+            <a:ext uri="{FF2B5EF4-FFF2-40B4-BE49-F238E27FC236}">
+              <a16:creationId xmlns:a16="http://schemas.microsoft.com/office/drawing/2014/main" id="{F9B5B8D3-BA8B-E36F-262B-F67DB7014BE5}"/>
+            </a:ext>
+          </a:extLst>
+        </p:cNvPr>
+        <p:cNvGrpSpPr/>
+        <p:nvPr/>
+      </p:nvGrpSpPr>
+      <p:grpSpPr>
+        <a:xfrm>
+          <a:off x="0" y="0"/>
+          <a:ext cx="0" cy="0"/>
+          <a:chOff x="0" y="0"/>
+          <a:chExt cx="0" cy="0"/>
+        </a:xfrm>
+      </p:grpSpPr>
+      <p:pic>
+        <p:nvPicPr>
+          <p:cNvPr id="6" name="Picture 5">
+            <a:extLst>
+              <a:ext uri="{FF2B5EF4-FFF2-40B4-BE49-F238E27FC236}">
+                <a16:creationId xmlns:a16="http://schemas.microsoft.com/office/drawing/2014/main" id="{31DA4B54-0664-2995-AB02-96B9F9459772}"/>
+              </a:ext>
+            </a:extLst>
+          </p:cNvPr>
+          <p:cNvPicPr>
+            <a:picLocks noChangeAspect="1"/>
+          </p:cNvPicPr>
+          <p:nvPr/>
+        </p:nvPicPr>
+        <p:blipFill>
+          <a:blip r:embed="rId2"/>
+          <a:stretch>
+            <a:fillRect/>
+          </a:stretch>
+        </p:blipFill>
+        <p:spPr>
+          <a:xfrm>
+            <a:off x="439964" y="794657"/>
+            <a:ext cx="4889500" cy="4876800"/>
+          </a:xfrm>
+          <a:prstGeom prst="rect">
+            <a:avLst/>
+          </a:prstGeom>
+        </p:spPr>
+      </p:pic>
+      <p:pic>
+        <p:nvPicPr>
+          <p:cNvPr id="8" name="Picture 7">
+            <a:extLst>
+              <a:ext uri="{FF2B5EF4-FFF2-40B4-BE49-F238E27FC236}">
+                <a16:creationId xmlns:a16="http://schemas.microsoft.com/office/drawing/2014/main" id="{A0075EDA-708D-03A4-72E6-5B3CE5EC50F4}"/>
+              </a:ext>
+            </a:extLst>
+          </p:cNvPr>
+          <p:cNvPicPr>
+            <a:picLocks noChangeAspect="1"/>
+          </p:cNvPicPr>
+          <p:nvPr/>
+        </p:nvPicPr>
+        <p:blipFill>
+          <a:blip r:embed="rId3"/>
+          <a:stretch>
+            <a:fillRect/>
+          </a:stretch>
+        </p:blipFill>
+        <p:spPr>
+          <a:xfrm>
+            <a:off x="5855607" y="794657"/>
+            <a:ext cx="5727700" cy="5143500"/>
+          </a:xfrm>
+          <a:prstGeom prst="rect">
+            <a:avLst/>
+          </a:prstGeom>
+        </p:spPr>
+      </p:pic>
+    </p:spTree>
+    <p:extLst>
+      <p:ext uri="{BB962C8B-B14F-4D97-AF65-F5344CB8AC3E}">
+        <p14:creationId xmlns:p14="http://schemas.microsoft.com/office/powerpoint/2010/main" val="1049147375"/>
       </p:ext>
     </p:extLst>
   </p:cSld>
@@ -6994,7 +7104,7 @@
                   </a:schemeClr>
                 </a:solidFill>
               </a:rPr>
-              <a:t>Al-Fatihah	</a:t>
+              <a:t>Al-Fatihah 	</a:t>
             </a:r>
             <a:r>
               <a:rPr lang="ar-AE" dirty="0">
@@ -8560,6 +8670,171 @@
                 </a:schemeClr>
               </a:solidFill>
             </a:endParaRPr>
+          </a:p>
+        </p:txBody>
+      </p:sp>
+      <p:sp>
+        <p:nvSpPr>
+          <p:cNvPr id="4" name="TextBox 3">
+            <a:extLst>
+              <a:ext uri="{FF2B5EF4-FFF2-40B4-BE49-F238E27FC236}">
+                <a16:creationId xmlns:a16="http://schemas.microsoft.com/office/drawing/2014/main" id="{3950A96C-7EF6-E3E9-9365-C14A9B4FEF52}"/>
+              </a:ext>
+            </a:extLst>
+          </p:cNvPr>
+          <p:cNvSpPr txBox="1"/>
+          <p:nvPr/>
+        </p:nvSpPr>
+        <p:spPr>
+          <a:xfrm>
+            <a:off x="2841812" y="873177"/>
+            <a:ext cx="1544629" cy="369332"/>
+          </a:xfrm>
+          <a:prstGeom prst="rect">
+            <a:avLst/>
+          </a:prstGeom>
+          <a:noFill/>
+        </p:spPr>
+        <p:txBody>
+          <a:bodyPr wrap="square">
+            <a:spAutoFit/>
+          </a:bodyPr>
+          <a:lstStyle/>
+          <a:p>
+            <a:r>
+              <a:rPr lang="en-US" dirty="0">
+                <a:solidFill>
+                  <a:schemeClr val="bg1">
+                    <a:lumMod val="50000"/>
+                  </a:schemeClr>
+                </a:solidFill>
+              </a:rPr>
+              <a:t>The Opener</a:t>
+            </a:r>
+            <a:endParaRPr lang="en-US" dirty="0"/>
+          </a:p>
+        </p:txBody>
+      </p:sp>
+      <p:sp>
+        <p:nvSpPr>
+          <p:cNvPr id="5" name="TextBox 4">
+            <a:extLst>
+              <a:ext uri="{FF2B5EF4-FFF2-40B4-BE49-F238E27FC236}">
+                <a16:creationId xmlns:a16="http://schemas.microsoft.com/office/drawing/2014/main" id="{B48BDAEC-CBBA-1222-BD24-DC017D07EA8B}"/>
+              </a:ext>
+            </a:extLst>
+          </p:cNvPr>
+          <p:cNvSpPr txBox="1"/>
+          <p:nvPr/>
+        </p:nvSpPr>
+        <p:spPr>
+          <a:xfrm>
+            <a:off x="2862038" y="1751258"/>
+            <a:ext cx="1544629" cy="369332"/>
+          </a:xfrm>
+          <a:prstGeom prst="rect">
+            <a:avLst/>
+          </a:prstGeom>
+          <a:noFill/>
+        </p:spPr>
+        <p:txBody>
+          <a:bodyPr wrap="square">
+            <a:spAutoFit/>
+          </a:bodyPr>
+          <a:lstStyle/>
+          <a:p>
+            <a:r>
+              <a:rPr lang="en-US" dirty="0">
+                <a:solidFill>
+                  <a:schemeClr val="bg1">
+                    <a:lumMod val="50000"/>
+                  </a:schemeClr>
+                </a:solidFill>
+              </a:rPr>
+              <a:t>The Opener</a:t>
+            </a:r>
+            <a:endParaRPr lang="en-US" dirty="0"/>
+          </a:p>
+        </p:txBody>
+      </p:sp>
+      <p:sp>
+        <p:nvSpPr>
+          <p:cNvPr id="6" name="TextBox 5">
+            <a:extLst>
+              <a:ext uri="{FF2B5EF4-FFF2-40B4-BE49-F238E27FC236}">
+                <a16:creationId xmlns:a16="http://schemas.microsoft.com/office/drawing/2014/main" id="{62D1B0FC-951B-E213-1505-7CAA90E1F524}"/>
+              </a:ext>
+            </a:extLst>
+          </p:cNvPr>
+          <p:cNvSpPr txBox="1"/>
+          <p:nvPr/>
+        </p:nvSpPr>
+        <p:spPr>
+          <a:xfrm>
+            <a:off x="2844834" y="2515077"/>
+            <a:ext cx="1544629" cy="369332"/>
+          </a:xfrm>
+          <a:prstGeom prst="rect">
+            <a:avLst/>
+          </a:prstGeom>
+          <a:noFill/>
+        </p:spPr>
+        <p:txBody>
+          <a:bodyPr wrap="square">
+            <a:spAutoFit/>
+          </a:bodyPr>
+          <a:lstStyle/>
+          <a:p>
+            <a:r>
+              <a:rPr lang="en-US" dirty="0">
+                <a:solidFill>
+                  <a:schemeClr val="bg1">
+                    <a:lumMod val="50000"/>
+                  </a:schemeClr>
+                </a:solidFill>
+              </a:rPr>
+              <a:t>The Opener</a:t>
+            </a:r>
+            <a:endParaRPr lang="en-US" dirty="0"/>
+          </a:p>
+        </p:txBody>
+      </p:sp>
+      <p:sp>
+        <p:nvSpPr>
+          <p:cNvPr id="7" name="TextBox 6">
+            <a:extLst>
+              <a:ext uri="{FF2B5EF4-FFF2-40B4-BE49-F238E27FC236}">
+                <a16:creationId xmlns:a16="http://schemas.microsoft.com/office/drawing/2014/main" id="{6008C0FB-6953-C968-FF05-5C7ECBB2F778}"/>
+              </a:ext>
+            </a:extLst>
+          </p:cNvPr>
+          <p:cNvSpPr txBox="1"/>
+          <p:nvPr/>
+        </p:nvSpPr>
+        <p:spPr>
+          <a:xfrm>
+            <a:off x="8817684" y="1709317"/>
+            <a:ext cx="1370829" cy="369332"/>
+          </a:xfrm>
+          <a:prstGeom prst="rect">
+            <a:avLst/>
+          </a:prstGeom>
+          <a:noFill/>
+        </p:spPr>
+        <p:txBody>
+          <a:bodyPr wrap="square">
+            <a:spAutoFit/>
+          </a:bodyPr>
+          <a:lstStyle/>
+          <a:p>
+            <a:r>
+              <a:rPr lang="en-US" dirty="0">
+                <a:solidFill>
+                  <a:srgbClr val="00B050"/>
+                </a:solidFill>
+              </a:rPr>
+              <a:t>The Opener</a:t>
+            </a:r>
           </a:p>
         </p:txBody>
       </p:sp>

</xml_diff>

<commit_message>
custom pointer cursor to frontend
Introduced a new pointer.svg asset and updated index.css to use it as the cursor for body, links, buttons, and divs. Also updated GUI-design.pptx with new changes.
</commit_message>
<xml_diff>
--- a/GUI-design.pptx
+++ b/GUI-design.pptx
@@ -5,7 +5,7 @@
     <p:sldMasterId id="2147483648" r:id="rId1"/>
   </p:sldMasterIdLst>
   <p:notesMasterIdLst>
-    <p:notesMasterId r:id="rId15"/>
+    <p:notesMasterId r:id="rId16"/>
   </p:notesMasterIdLst>
   <p:sldIdLst>
     <p:sldId id="266" r:id="rId2"/>
@@ -21,6 +21,7 @@
     <p:sldId id="267" r:id="rId12"/>
     <p:sldId id="270" r:id="rId13"/>
     <p:sldId id="271" r:id="rId14"/>
+    <p:sldId id="272" r:id="rId15"/>
   </p:sldIdLst>
   <p:sldSz cx="12192000" cy="6858000"/>
   <p:notesSz cx="6858000" cy="9144000"/>
@@ -265,7 +266,7 @@
           <a:p>
             <a:fld id="{241CD573-D599-2847-BBDA-6BFAA524DB5F}" type="datetimeFigureOut">
               <a:rPr lang="en-US" smtClean="0"/>
-              <a:t>11/22/25</a:t>
+              <a:t>11/25/25</a:t>
             </a:fld>
             <a:endParaRPr lang="en-US"/>
           </a:p>
@@ -679,7 +680,7 @@
           <a:p>
             <a:fld id="{8738307C-8EDA-4B45-B77E-3F369AD75B9E}" type="datetimeFigureOut">
               <a:rPr lang="en-US" smtClean="0"/>
-              <a:t>11/22/25</a:t>
+              <a:t>11/25/25</a:t>
             </a:fld>
             <a:endParaRPr lang="en-US"/>
           </a:p>
@@ -877,7 +878,7 @@
           <a:p>
             <a:fld id="{8738307C-8EDA-4B45-B77E-3F369AD75B9E}" type="datetimeFigureOut">
               <a:rPr lang="en-US" smtClean="0"/>
-              <a:t>11/22/25</a:t>
+              <a:t>11/25/25</a:t>
             </a:fld>
             <a:endParaRPr lang="en-US"/>
           </a:p>
@@ -1085,7 +1086,7 @@
           <a:p>
             <a:fld id="{8738307C-8EDA-4B45-B77E-3F369AD75B9E}" type="datetimeFigureOut">
               <a:rPr lang="en-US" smtClean="0"/>
-              <a:t>11/22/25</a:t>
+              <a:t>11/25/25</a:t>
             </a:fld>
             <a:endParaRPr lang="en-US"/>
           </a:p>
@@ -1283,7 +1284,7 @@
           <a:p>
             <a:fld id="{8738307C-8EDA-4B45-B77E-3F369AD75B9E}" type="datetimeFigureOut">
               <a:rPr lang="en-US" smtClean="0"/>
-              <a:t>11/22/25</a:t>
+              <a:t>11/25/25</a:t>
             </a:fld>
             <a:endParaRPr lang="en-US"/>
           </a:p>
@@ -1558,7 +1559,7 @@
           <a:p>
             <a:fld id="{8738307C-8EDA-4B45-B77E-3F369AD75B9E}" type="datetimeFigureOut">
               <a:rPr lang="en-US" smtClean="0"/>
-              <a:t>11/22/25</a:t>
+              <a:t>11/25/25</a:t>
             </a:fld>
             <a:endParaRPr lang="en-US"/>
           </a:p>
@@ -1823,7 +1824,7 @@
           <a:p>
             <a:fld id="{8738307C-8EDA-4B45-B77E-3F369AD75B9E}" type="datetimeFigureOut">
               <a:rPr lang="en-US" smtClean="0"/>
-              <a:t>11/22/25</a:t>
+              <a:t>11/25/25</a:t>
             </a:fld>
             <a:endParaRPr lang="en-US"/>
           </a:p>
@@ -2235,7 +2236,7 @@
           <a:p>
             <a:fld id="{8738307C-8EDA-4B45-B77E-3F369AD75B9E}" type="datetimeFigureOut">
               <a:rPr lang="en-US" smtClean="0"/>
-              <a:t>11/22/25</a:t>
+              <a:t>11/25/25</a:t>
             </a:fld>
             <a:endParaRPr lang="en-US"/>
           </a:p>
@@ -2376,7 +2377,7 @@
           <a:p>
             <a:fld id="{8738307C-8EDA-4B45-B77E-3F369AD75B9E}" type="datetimeFigureOut">
               <a:rPr lang="en-US" smtClean="0"/>
-              <a:t>11/22/25</a:t>
+              <a:t>11/25/25</a:t>
             </a:fld>
             <a:endParaRPr lang="en-US"/>
           </a:p>
@@ -2489,7 +2490,7 @@
           <a:p>
             <a:fld id="{8738307C-8EDA-4B45-B77E-3F369AD75B9E}" type="datetimeFigureOut">
               <a:rPr lang="en-US" smtClean="0"/>
-              <a:t>11/22/25</a:t>
+              <a:t>11/25/25</a:t>
             </a:fld>
             <a:endParaRPr lang="en-US"/>
           </a:p>
@@ -2800,7 +2801,7 @@
           <a:p>
             <a:fld id="{8738307C-8EDA-4B45-B77E-3F369AD75B9E}" type="datetimeFigureOut">
               <a:rPr lang="en-US" smtClean="0"/>
-              <a:t>11/22/25</a:t>
+              <a:t>11/25/25</a:t>
             </a:fld>
             <a:endParaRPr lang="en-US"/>
           </a:p>
@@ -3088,7 +3089,7 @@
           <a:p>
             <a:fld id="{8738307C-8EDA-4B45-B77E-3F369AD75B9E}" type="datetimeFigureOut">
               <a:rPr lang="en-US" smtClean="0"/>
-              <a:t>11/22/25</a:t>
+              <a:t>11/25/25</a:t>
             </a:fld>
             <a:endParaRPr lang="en-US"/>
           </a:p>
@@ -3329,7 +3330,7 @@
           <a:p>
             <a:fld id="{8738307C-8EDA-4B45-B77E-3F369AD75B9E}" type="datetimeFigureOut">
               <a:rPr lang="en-US" smtClean="0"/>
-              <a:t>11/22/25</a:t>
+              <a:t>11/25/25</a:t>
             </a:fld>
             <a:endParaRPr lang="en-US"/>
           </a:p>
@@ -8529,6 +8530,280 @@
 </p:sld>
 </file>
 
+<file path=ppt/slides/slide14.xml><?xml version="1.0" encoding="utf-8"?>
+<p:sld xmlns:a="http://schemas.openxmlformats.org/drawingml/2006/main" xmlns:r="http://schemas.openxmlformats.org/officeDocument/2006/relationships" xmlns:p="http://schemas.openxmlformats.org/presentationml/2006/main">
+  <p:cSld>
+    <p:spTree>
+      <p:nvGrpSpPr>
+        <p:cNvPr id="1" name=""/>
+        <p:cNvGrpSpPr/>
+        <p:nvPr/>
+      </p:nvGrpSpPr>
+      <p:grpSpPr>
+        <a:xfrm>
+          <a:off x="0" y="0"/>
+          <a:ext cx="0" cy="0"/>
+          <a:chOff x="0" y="0"/>
+          <a:chExt cx="0" cy="0"/>
+        </a:xfrm>
+      </p:grpSpPr>
+      <p:sp>
+        <p:nvSpPr>
+          <p:cNvPr id="10" name="Rounded Rectangle 9">
+            <a:extLst>
+              <a:ext uri="{FF2B5EF4-FFF2-40B4-BE49-F238E27FC236}">
+                <a16:creationId xmlns:a16="http://schemas.microsoft.com/office/drawing/2014/main" id="{6454C21D-90CD-444A-2281-DCBAC8A0F4FD}"/>
+              </a:ext>
+            </a:extLst>
+          </p:cNvPr>
+          <p:cNvSpPr/>
+          <p:nvPr/>
+        </p:nvSpPr>
+        <p:spPr>
+          <a:xfrm>
+            <a:off x="2046514" y="2265180"/>
+            <a:ext cx="3541486" cy="3904343"/>
+          </a:xfrm>
+          <a:prstGeom prst="roundRect">
+            <a:avLst/>
+          </a:prstGeom>
+          <a:solidFill>
+            <a:schemeClr val="bg1">
+              <a:lumMod val="95000"/>
+            </a:schemeClr>
+          </a:solidFill>
+          <a:ln>
+            <a:noFill/>
+          </a:ln>
+        </p:spPr>
+        <p:style>
+          <a:lnRef idx="2">
+            <a:schemeClr val="accent1">
+              <a:shade val="15000"/>
+            </a:schemeClr>
+          </a:lnRef>
+          <a:fillRef idx="1">
+            <a:schemeClr val="accent1"/>
+          </a:fillRef>
+          <a:effectRef idx="0">
+            <a:schemeClr val="accent1"/>
+          </a:effectRef>
+          <a:fontRef idx="minor">
+            <a:schemeClr val="lt1"/>
+          </a:fontRef>
+        </p:style>
+        <p:txBody>
+          <a:bodyPr rtlCol="0" anchor="ctr"/>
+          <a:lstStyle/>
+          <a:p>
+            <a:pPr algn="ctr"/>
+            <a:endParaRPr lang="en-US"/>
+          </a:p>
+        </p:txBody>
+      </p:sp>
+      <p:sp>
+        <p:nvSpPr>
+          <p:cNvPr id="7" name="TextBox 6">
+            <a:extLst>
+              <a:ext uri="{FF2B5EF4-FFF2-40B4-BE49-F238E27FC236}">
+                <a16:creationId xmlns:a16="http://schemas.microsoft.com/office/drawing/2014/main" id="{68B34B20-9D2C-B6F5-A79E-E210755F9136}"/>
+              </a:ext>
+            </a:extLst>
+          </p:cNvPr>
+          <p:cNvSpPr txBox="1"/>
+          <p:nvPr/>
+        </p:nvSpPr>
+        <p:spPr>
+          <a:xfrm>
+            <a:off x="4209142" y="250217"/>
+            <a:ext cx="3541487" cy="1631216"/>
+          </a:xfrm>
+          <a:prstGeom prst="rect">
+            <a:avLst/>
+          </a:prstGeom>
+          <a:noFill/>
+        </p:spPr>
+        <p:txBody>
+          <a:bodyPr wrap="square" rtlCol="0">
+            <a:spAutoFit/>
+          </a:bodyPr>
+          <a:lstStyle/>
+          <a:p>
+            <a:r>
+              <a:rPr lang="en-US" sz="4000" dirty="0">
+                <a:solidFill>
+                  <a:sysClr val="windowText" lastClr="000000"/>
+                </a:solidFill>
+              </a:rPr>
+              <a:t>Mouse Pointer</a:t>
+            </a:r>
+            <a:br>
+              <a:rPr lang="en-US" sz="4000" dirty="0">
+                <a:solidFill>
+                  <a:sysClr val="windowText" lastClr="000000"/>
+                </a:solidFill>
+              </a:rPr>
+            </a:br>
+            <a:r>
+              <a:rPr lang="en-US" sz="2000" dirty="0">
+                <a:solidFill>
+                  <a:sysClr val="windowText" lastClr="000000"/>
+                </a:solidFill>
+              </a:rPr>
+              <a:t>-transparent</a:t>
+            </a:r>
+            <a:br>
+              <a:rPr lang="en-US" sz="2000" dirty="0">
+                <a:solidFill>
+                  <a:sysClr val="windowText" lastClr="000000"/>
+                </a:solidFill>
+              </a:rPr>
+            </a:br>
+            <a:endParaRPr lang="en-US" sz="4000" dirty="0">
+              <a:solidFill>
+                <a:sysClr val="windowText" lastClr="000000"/>
+              </a:solidFill>
+            </a:endParaRPr>
+          </a:p>
+        </p:txBody>
+      </p:sp>
+      <p:sp>
+        <p:nvSpPr>
+          <p:cNvPr id="8" name="Rounded Rectangle 7">
+            <a:extLst>
+              <a:ext uri="{FF2B5EF4-FFF2-40B4-BE49-F238E27FC236}">
+                <a16:creationId xmlns:a16="http://schemas.microsoft.com/office/drawing/2014/main" id="{A01C9A54-1F32-6A5A-163A-69946D034A0E}"/>
+              </a:ext>
+            </a:extLst>
+          </p:cNvPr>
+          <p:cNvSpPr/>
+          <p:nvPr/>
+        </p:nvSpPr>
+        <p:spPr>
+          <a:xfrm>
+            <a:off x="6371771" y="2189209"/>
+            <a:ext cx="3541486" cy="3904343"/>
+          </a:xfrm>
+          <a:prstGeom prst="roundRect">
+            <a:avLst/>
+          </a:prstGeom>
+          <a:solidFill>
+            <a:schemeClr val="tx1">
+              <a:lumMod val="95000"/>
+              <a:lumOff val="5000"/>
+            </a:schemeClr>
+          </a:solidFill>
+        </p:spPr>
+        <p:style>
+          <a:lnRef idx="2">
+            <a:schemeClr val="accent1">
+              <a:shade val="15000"/>
+            </a:schemeClr>
+          </a:lnRef>
+          <a:fillRef idx="1">
+            <a:schemeClr val="accent1"/>
+          </a:fillRef>
+          <a:effectRef idx="0">
+            <a:schemeClr val="accent1"/>
+          </a:effectRef>
+          <a:fontRef idx="minor">
+            <a:schemeClr val="lt1"/>
+          </a:fontRef>
+        </p:style>
+        <p:txBody>
+          <a:bodyPr rtlCol="0" anchor="ctr"/>
+          <a:lstStyle/>
+          <a:p>
+            <a:pPr algn="ctr"/>
+            <a:endParaRPr lang="en-US"/>
+          </a:p>
+        </p:txBody>
+      </p:sp>
+      <p:pic>
+        <p:nvPicPr>
+          <p:cNvPr id="13" name="Graphic 12">
+            <a:extLst>
+              <a:ext uri="{FF2B5EF4-FFF2-40B4-BE49-F238E27FC236}">
+                <a16:creationId xmlns:a16="http://schemas.microsoft.com/office/drawing/2014/main" id="{C93A6B16-9CBF-441F-D1D3-239207CF3A2E}"/>
+              </a:ext>
+            </a:extLst>
+          </p:cNvPr>
+          <p:cNvPicPr>
+            <a:picLocks noChangeAspect="1"/>
+          </p:cNvPicPr>
+          <p:nvPr/>
+        </p:nvPicPr>
+        <p:blipFill>
+          <a:blip r:embed="rId2">
+            <a:extLst>
+              <a:ext uri="{96DAC541-7B7A-43D3-8B79-37D633B846F1}">
+                <asvg:svgBlip xmlns:asvg="http://schemas.microsoft.com/office/drawing/2016/SVG/main" r:embed="rId3"/>
+              </a:ext>
+            </a:extLst>
+          </a:blip>
+          <a:stretch>
+            <a:fillRect/>
+          </a:stretch>
+        </p:blipFill>
+        <p:spPr>
+          <a:xfrm>
+            <a:off x="2999182" y="2501042"/>
+            <a:ext cx="2228850" cy="2743200"/>
+          </a:xfrm>
+          <a:prstGeom prst="rect">
+            <a:avLst/>
+          </a:prstGeom>
+        </p:spPr>
+      </p:pic>
+      <p:pic>
+        <p:nvPicPr>
+          <p:cNvPr id="14" name="Graphic 13">
+            <a:extLst>
+              <a:ext uri="{FF2B5EF4-FFF2-40B4-BE49-F238E27FC236}">
+                <a16:creationId xmlns:a16="http://schemas.microsoft.com/office/drawing/2014/main" id="{B5C608A3-F58C-445A-8C33-44B1F43741C4}"/>
+              </a:ext>
+            </a:extLst>
+          </p:cNvPr>
+          <p:cNvPicPr>
+            <a:picLocks noChangeAspect="1"/>
+          </p:cNvPicPr>
+          <p:nvPr/>
+        </p:nvPicPr>
+        <p:blipFill>
+          <a:blip r:embed="rId2">
+            <a:extLst>
+              <a:ext uri="{96DAC541-7B7A-43D3-8B79-37D633B846F1}">
+                <asvg:svgBlip xmlns:asvg="http://schemas.microsoft.com/office/drawing/2016/SVG/main" r:embed="rId3"/>
+              </a:ext>
+            </a:extLst>
+          </a:blip>
+          <a:stretch>
+            <a:fillRect/>
+          </a:stretch>
+        </p:blipFill>
+        <p:spPr>
+          <a:xfrm>
+            <a:off x="7387738" y="2501042"/>
+            <a:ext cx="2228850" cy="2743200"/>
+          </a:xfrm>
+          <a:prstGeom prst="rect">
+            <a:avLst/>
+          </a:prstGeom>
+        </p:spPr>
+      </p:pic>
+    </p:spTree>
+    <p:extLst>
+      <p:ext uri="{BB962C8B-B14F-4D97-AF65-F5344CB8AC3E}">
+        <p14:creationId xmlns:p14="http://schemas.microsoft.com/office/powerpoint/2010/main" val="974154384"/>
+      </p:ext>
+    </p:extLst>
+  </p:cSld>
+  <p:clrMapOvr>
+    <a:masterClrMapping/>
+  </p:clrMapOvr>
+</p:sld>
+</file>
+
 <file path=ppt/slides/slide2.xml><?xml version="1.0" encoding="utf-8"?>
 <p:sld xmlns:a="http://schemas.openxmlformats.org/drawingml/2006/main" xmlns:r="http://schemas.openxmlformats.org/officeDocument/2006/relationships" xmlns:p="http://schemas.openxmlformats.org/presentationml/2006/main">
   <p:cSld>
@@ -8718,8 +8993,8 @@
           </a:prstGeom>
         </p:spPr>
       </p:pic>
-      <mc:AlternateContent xmlns:mc="http://schemas.openxmlformats.org/markup-compatibility/2006">
-        <mc:Choice xmlns:p14="http://schemas.microsoft.com/office/powerpoint/2010/main" Requires="p14">
+      <mc:AlternateContent xmlns:mc="http://schemas.openxmlformats.org/markup-compatibility/2006" xmlns:p14="http://schemas.microsoft.com/office/powerpoint/2010/main">
+        <mc:Choice Requires="p14">
           <p:contentPart p14:bwMode="auto" r:id="rId4">
             <p14:nvContentPartPr>
               <p14:cNvPr id="15" name="Ink 14">
@@ -8738,7 +9013,7 @@
             </p14:xfrm>
           </p:contentPart>
         </mc:Choice>
-        <mc:Fallback>
+        <mc:Fallback xmlns="">
           <p:pic>
             <p:nvPicPr>
               <p:cNvPr id="15" name="Ink 14">
@@ -9350,8 +9625,8 @@
           </a:p>
         </p:txBody>
       </p:sp>
-      <mc:AlternateContent xmlns:mc="http://schemas.openxmlformats.org/markup-compatibility/2006">
-        <mc:Choice xmlns:p14="http://schemas.microsoft.com/office/powerpoint/2010/main" Requires="p14">
+      <mc:AlternateContent xmlns:mc="http://schemas.openxmlformats.org/markup-compatibility/2006" xmlns:p14="http://schemas.microsoft.com/office/powerpoint/2010/main">
+        <mc:Choice Requires="p14">
           <p:contentPart p14:bwMode="auto" r:id="rId6">
             <p14:nvContentPartPr>
               <p14:cNvPr id="2" name="Ink 1">
@@ -9370,7 +9645,7 @@
             </p14:xfrm>
           </p:contentPart>
         </mc:Choice>
-        <mc:Fallback>
+        <mc:Fallback xmlns="">
           <p:pic>
             <p:nvPicPr>
               <p:cNvPr id="2" name="Ink 1">
@@ -14791,7 +15066,9 @@
           <a:p>
             <a:pPr algn="ctr"/>
             <a:r>
-              <a:rPr lang="en-US" dirty="0"/>
+              <a:rPr lang="en-US" dirty="0">
+                <a:latin typeface=""/>
+              </a:rPr>
               <a:t>1</a:t>
             </a:r>
           </a:p>

</xml_diff>